<commit_message>
improve name and description usage (#734)
</commit_message>
<xml_diff>
--- a/development/images/develop_guide_name_description_usage.pptx
+++ b/development/images/develop_guide_name_description_usage.pptx
@@ -104,6 +104,11 @@
       </a:defRPr>
     </a:lvl9pPr>
   </p:defaultTextStyle>
+  <p:extLst>
+    <p:ext uri="{EFAFB233-063F-42B5-8137-9DF3F51BA10A}">
+      <p15:sldGuideLst xmlns:p15="http://schemas.microsoft.com/office/powerpoint/2012/main"/>
+    </p:ext>
+  </p:extLst>
 </p:presentation>
 </file>
 
@@ -256,7 +261,7 @@
           <a:p>
             <a:fld id="{93C349B2-D973-4495-8F6A-7BB2A2B43ECD}" type="datetimeFigureOut">
               <a:rPr lang="en-US" smtClean="0"/>
-              <a:t>10/27/2021</a:t>
+              <a:t>10/28/2021</a:t>
             </a:fld>
             <a:endParaRPr lang="en-US"/>
           </a:p>
@@ -456,7 +461,7 @@
           <a:p>
             <a:fld id="{93C349B2-D973-4495-8F6A-7BB2A2B43ECD}" type="datetimeFigureOut">
               <a:rPr lang="en-US" smtClean="0"/>
-              <a:t>10/27/2021</a:t>
+              <a:t>10/28/2021</a:t>
             </a:fld>
             <a:endParaRPr lang="en-US"/>
           </a:p>
@@ -666,7 +671,7 @@
           <a:p>
             <a:fld id="{93C349B2-D973-4495-8F6A-7BB2A2B43ECD}" type="datetimeFigureOut">
               <a:rPr lang="en-US" smtClean="0"/>
-              <a:t>10/27/2021</a:t>
+              <a:t>10/28/2021</a:t>
             </a:fld>
             <a:endParaRPr lang="en-US"/>
           </a:p>
@@ -866,7 +871,7 @@
           <a:p>
             <a:fld id="{93C349B2-D973-4495-8F6A-7BB2A2B43ECD}" type="datetimeFigureOut">
               <a:rPr lang="en-US" smtClean="0"/>
-              <a:t>10/27/2021</a:t>
+              <a:t>10/28/2021</a:t>
             </a:fld>
             <a:endParaRPr lang="en-US"/>
           </a:p>
@@ -1142,7 +1147,7 @@
           <a:p>
             <a:fld id="{93C349B2-D973-4495-8F6A-7BB2A2B43ECD}" type="datetimeFigureOut">
               <a:rPr lang="en-US" smtClean="0"/>
-              <a:t>10/27/2021</a:t>
+              <a:t>10/28/2021</a:t>
             </a:fld>
             <a:endParaRPr lang="en-US"/>
           </a:p>
@@ -1410,7 +1415,7 @@
           <a:p>
             <a:fld id="{93C349B2-D973-4495-8F6A-7BB2A2B43ECD}" type="datetimeFigureOut">
               <a:rPr lang="en-US" smtClean="0"/>
-              <a:t>10/27/2021</a:t>
+              <a:t>10/28/2021</a:t>
             </a:fld>
             <a:endParaRPr lang="en-US"/>
           </a:p>
@@ -1825,7 +1830,7 @@
           <a:p>
             <a:fld id="{93C349B2-D973-4495-8F6A-7BB2A2B43ECD}" type="datetimeFigureOut">
               <a:rPr lang="en-US" smtClean="0"/>
-              <a:t>10/27/2021</a:t>
+              <a:t>10/28/2021</a:t>
             </a:fld>
             <a:endParaRPr lang="en-US"/>
           </a:p>
@@ -1967,7 +1972,7 @@
           <a:p>
             <a:fld id="{93C349B2-D973-4495-8F6A-7BB2A2B43ECD}" type="datetimeFigureOut">
               <a:rPr lang="en-US" smtClean="0"/>
-              <a:t>10/27/2021</a:t>
+              <a:t>10/28/2021</a:t>
             </a:fld>
             <a:endParaRPr lang="en-US"/>
           </a:p>
@@ -2080,7 +2085,7 @@
           <a:p>
             <a:fld id="{93C349B2-D973-4495-8F6A-7BB2A2B43ECD}" type="datetimeFigureOut">
               <a:rPr lang="en-US" smtClean="0"/>
-              <a:t>10/27/2021</a:t>
+              <a:t>10/28/2021</a:t>
             </a:fld>
             <a:endParaRPr lang="en-US"/>
           </a:p>
@@ -2393,7 +2398,7 @@
           <a:p>
             <a:fld id="{93C349B2-D973-4495-8F6A-7BB2A2B43ECD}" type="datetimeFigureOut">
               <a:rPr lang="en-US" smtClean="0"/>
-              <a:t>10/27/2021</a:t>
+              <a:t>10/28/2021</a:t>
             </a:fld>
             <a:endParaRPr lang="en-US"/>
           </a:p>
@@ -2682,7 +2687,7 @@
           <a:p>
             <a:fld id="{93C349B2-D973-4495-8F6A-7BB2A2B43ECD}" type="datetimeFigureOut">
               <a:rPr lang="en-US" smtClean="0"/>
-              <a:t>10/27/2021</a:t>
+              <a:t>10/28/2021</a:t>
             </a:fld>
             <a:endParaRPr lang="en-US"/>
           </a:p>
@@ -2925,7 +2930,7 @@
           <a:p>
             <a:fld id="{93C349B2-D973-4495-8F6A-7BB2A2B43ECD}" type="datetimeFigureOut">
               <a:rPr lang="en-US" smtClean="0"/>
-              <a:t>10/27/2021</a:t>
+              <a:t>10/28/2021</a:t>
             </a:fld>
             <a:endParaRPr lang="en-US"/>
           </a:p>
@@ -3357,14 +3362,14 @@
           <p:nvPr>
             <p:extLst>
               <p:ext uri="{D42A27DB-BD31-4B8C-83A1-F6EECF244321}">
-                <p14:modId xmlns:p14="http://schemas.microsoft.com/office/powerpoint/2010/main" val="1814152293"/>
+                <p14:modId xmlns:p14="http://schemas.microsoft.com/office/powerpoint/2010/main" val="2056203828"/>
               </p:ext>
             </p:extLst>
           </p:nvPr>
         </p:nvGraphicFramePr>
         <p:xfrm>
-          <a:off x="6201612" y="1118298"/>
-          <a:ext cx="1312779" cy="1420255"/>
+          <a:off x="6201613" y="1163312"/>
+          <a:ext cx="3196388" cy="1240151"/>
         </p:xfrm>
         <a:graphic>
           <a:graphicData uri="http://schemas.openxmlformats.org/drawingml/2006/table">
@@ -3373,29 +3378,46 @@
                 <a:tableStyleId>{F5AB1C69-6EDB-4FF4-983F-18BD219EF322}</a:tableStyleId>
               </a:tblPr>
               <a:tblGrid>
-                <a:gridCol w="1312779">
+                <a:gridCol w="1093540">
                   <a:extLst>
                     <a:ext uri="{9D8B030D-6E8A-4147-A177-3AD203B41FA5}">
                       <a16:colId xmlns:a16="http://schemas.microsoft.com/office/drawing/2014/main" val="19099913"/>
                     </a:ext>
                   </a:extLst>
                 </a:gridCol>
+                <a:gridCol w="2102848">
+                  <a:extLst>
+                    <a:ext uri="{9D8B030D-6E8A-4147-A177-3AD203B41FA5}">
+                      <a16:colId xmlns:a16="http://schemas.microsoft.com/office/drawing/2014/main" val="2722158555"/>
+                    </a:ext>
+                  </a:extLst>
+                </a:gridCol>
               </a:tblGrid>
-              <a:tr h="234350">
+              <a:tr h="0">
                 <a:tc>
                   <a:txBody>
                     <a:bodyPr/>
                     <a:lstStyle/>
                     <a:p>
                       <a:r>
-                        <a:rPr lang="de-DE" sz="900" dirty="0"/>
-                        <a:t>Load </a:t>
-                      </a:r>
-                      <a:r>
-                        <a:rPr lang="de-DE" sz="900" dirty="0" err="1"/>
-                        <a:t>cases</a:t>
-                      </a:r>
-                      <a:endParaRPr lang="en-US" sz="900" dirty="0"/>
+                        <a:rPr lang="de-DE" sz="700" dirty="0" err="1"/>
+                        <a:t>name</a:t>
+                      </a:r>
+                      <a:endParaRPr lang="en-US" sz="700" dirty="0"/>
+                    </a:p>
+                  </a:txBody>
+                  <a:tcPr/>
+                </a:tc>
+                <a:tc>
+                  <a:txBody>
+                    <a:bodyPr/>
+                    <a:lstStyle/>
+                    <a:p>
+                      <a:r>
+                        <a:rPr lang="de-DE" sz="700" dirty="0" err="1"/>
+                        <a:t>description</a:t>
+                      </a:r>
+                      <a:endParaRPr lang="en-US" sz="700" dirty="0"/>
                     </a:p>
                   </a:txBody>
                   <a:tcPr/>
@@ -3406,29 +3428,87 @@
                   </a:ext>
                 </a:extLst>
               </a:tr>
-              <a:tr h="237181">
+              <a:tr h="181492">
                 <a:tc>
                   <a:txBody>
                     <a:bodyPr/>
                     <a:lstStyle/>
                     <a:p>
                       <a:r>
-                        <a:rPr lang="de-DE" sz="900" dirty="0"/>
+                        <a:rPr lang="de-DE" sz="700" dirty="0"/>
                         <a:t>2g pull-</a:t>
                       </a:r>
                       <a:r>
-                        <a:rPr lang="de-DE" sz="900" dirty="0" err="1"/>
+                        <a:rPr lang="de-DE" sz="700" dirty="0" err="1"/>
                         <a:t>up</a:t>
                       </a:r>
                       <a:r>
-                        <a:rPr lang="de-DE" sz="900" dirty="0"/>
+                        <a:rPr lang="de-DE" sz="700" dirty="0"/>
                         <a:t> </a:t>
                       </a:r>
                       <a:r>
-                        <a:rPr lang="de-DE" sz="900" dirty="0" err="1"/>
+                        <a:rPr lang="de-DE" sz="700" dirty="0" err="1"/>
                         <a:t>case</a:t>
                       </a:r>
-                      <a:endParaRPr lang="en-US" sz="900" dirty="0"/>
+                      <a:endParaRPr lang="en-US" sz="700" dirty="0"/>
+                    </a:p>
+                  </a:txBody>
+                  <a:tcPr/>
+                </a:tc>
+                <a:tc>
+                  <a:txBody>
+                    <a:bodyPr/>
+                    <a:lstStyle/>
+                    <a:p>
+                      <a:r>
+                        <a:rPr lang="de-DE" sz="700" dirty="0"/>
+                        <a:t>This </a:t>
+                      </a:r>
+                      <a:r>
+                        <a:rPr lang="de-DE" sz="700" dirty="0" err="1"/>
+                        <a:t>is</a:t>
+                      </a:r>
+                      <a:r>
+                        <a:rPr lang="de-DE" sz="700" dirty="0"/>
+                        <a:t> a 2g pull-</a:t>
+                      </a:r>
+                      <a:r>
+                        <a:rPr lang="de-DE" sz="700" dirty="0" err="1"/>
+                        <a:t>up</a:t>
+                      </a:r>
+                      <a:r>
+                        <a:rPr lang="de-DE" sz="700" dirty="0"/>
+                        <a:t> </a:t>
+                      </a:r>
+                      <a:r>
+                        <a:rPr lang="de-DE" sz="700" dirty="0" err="1"/>
+                        <a:t>case</a:t>
+                      </a:r>
+                      <a:r>
+                        <a:rPr lang="de-DE" sz="700" dirty="0"/>
+                        <a:t> </a:t>
+                      </a:r>
+                      <a:r>
+                        <a:rPr lang="de-DE" sz="700" dirty="0" err="1"/>
+                        <a:t>used</a:t>
+                      </a:r>
+                      <a:r>
+                        <a:rPr lang="de-DE" sz="700" dirty="0"/>
+                        <a:t> </a:t>
+                      </a:r>
+                      <a:r>
+                        <a:rPr lang="de-DE" sz="700" dirty="0" err="1"/>
+                        <a:t>for</a:t>
+                      </a:r>
+                      <a:r>
+                        <a:rPr lang="de-DE" sz="700" dirty="0"/>
+                        <a:t> </a:t>
+                      </a:r>
+                      <a:r>
+                        <a:rPr lang="de-DE" sz="700" dirty="0" err="1"/>
+                        <a:t>certification</a:t>
+                      </a:r>
+                      <a:endParaRPr lang="en-US" sz="700" dirty="0"/>
                     </a:p>
                   </a:txBody>
                   <a:tcPr/>
@@ -3439,29 +3519,104 @@
                   </a:ext>
                 </a:extLst>
               </a:tr>
-              <a:tr h="237181">
+              <a:tr h="181492">
                 <a:tc>
                   <a:txBody>
                     <a:bodyPr/>
                     <a:lstStyle/>
                     <a:p>
                       <a:r>
-                        <a:rPr lang="de-DE" sz="900" dirty="0"/>
+                        <a:rPr lang="de-DE" sz="700" dirty="0"/>
                         <a:t>4g pull-</a:t>
                       </a:r>
                       <a:r>
-                        <a:rPr lang="de-DE" sz="900" dirty="0" err="1"/>
+                        <a:rPr lang="de-DE" sz="700" dirty="0" err="1"/>
                         <a:t>up</a:t>
                       </a:r>
                       <a:r>
-                        <a:rPr lang="de-DE" sz="900" dirty="0"/>
+                        <a:rPr lang="de-DE" sz="700" dirty="0"/>
                         <a:t> </a:t>
                       </a:r>
                       <a:r>
-                        <a:rPr lang="de-DE" sz="900" dirty="0" err="1"/>
+                        <a:rPr lang="de-DE" sz="700" dirty="0" err="1"/>
                         <a:t>case</a:t>
                       </a:r>
-                      <a:endParaRPr lang="en-US" sz="900" dirty="0"/>
+                      <a:endParaRPr lang="en-US" sz="700" dirty="0"/>
+                    </a:p>
+                  </a:txBody>
+                  <a:tcPr/>
+                </a:tc>
+                <a:tc>
+                  <a:txBody>
+                    <a:bodyPr/>
+                    <a:lstStyle/>
+                    <a:p>
+                      <a:pPr marL="0" marR="0" lvl="0" indent="0" algn="l" defTabSz="914400" rtl="0" eaLnBrk="1" fontAlgn="auto" latinLnBrk="0" hangingPunct="1">
+                        <a:lnSpc>
+                          <a:spcPct val="100000"/>
+                        </a:lnSpc>
+                        <a:spcBef>
+                          <a:spcPts val="0"/>
+                        </a:spcBef>
+                        <a:spcAft>
+                          <a:spcPts val="0"/>
+                        </a:spcAft>
+                        <a:buClrTx/>
+                        <a:buSzTx/>
+                        <a:buFontTx/>
+                        <a:buNone/>
+                        <a:tabLst/>
+                        <a:defRPr/>
+                      </a:pPr>
+                      <a:r>
+                        <a:rPr lang="de-DE" sz="700" dirty="0"/>
+                        <a:t>This </a:t>
+                      </a:r>
+                      <a:r>
+                        <a:rPr lang="de-DE" sz="700" dirty="0" err="1"/>
+                        <a:t>is</a:t>
+                      </a:r>
+                      <a:r>
+                        <a:rPr lang="de-DE" sz="700" dirty="0"/>
+                        <a:t> a 4g pull-</a:t>
+                      </a:r>
+                      <a:r>
+                        <a:rPr lang="de-DE" sz="700" dirty="0" err="1"/>
+                        <a:t>up</a:t>
+                      </a:r>
+                      <a:r>
+                        <a:rPr lang="de-DE" sz="700" dirty="0"/>
+                        <a:t> </a:t>
+                      </a:r>
+                      <a:r>
+                        <a:rPr lang="de-DE" sz="700" dirty="0" err="1"/>
+                        <a:t>case</a:t>
+                      </a:r>
+                      <a:r>
+                        <a:rPr lang="de-DE" sz="700" dirty="0"/>
+                        <a:t> </a:t>
+                      </a:r>
+                      <a:r>
+                        <a:rPr lang="de-DE" sz="700" dirty="0" err="1"/>
+                        <a:t>used</a:t>
+                      </a:r>
+                      <a:r>
+                        <a:rPr lang="de-DE" sz="700" dirty="0"/>
+                        <a:t> </a:t>
+                      </a:r>
+                      <a:r>
+                        <a:rPr lang="de-DE" sz="700" dirty="0" err="1"/>
+                        <a:t>for</a:t>
+                      </a:r>
+                      <a:r>
+                        <a:rPr lang="de-DE" sz="700" dirty="0"/>
+                        <a:t> </a:t>
+                      </a:r>
+                      <a:r>
+                        <a:rPr lang="de-DE" sz="700" dirty="0" err="1"/>
+                        <a:t>certification</a:t>
+                      </a:r>
+                      <a:endParaRPr lang="en-US" sz="700" dirty="0"/>
                     </a:p>
                   </a:txBody>
                   <a:tcPr/>
@@ -3472,21 +3627,31 @@
                   </a:ext>
                 </a:extLst>
               </a:tr>
-              <a:tr h="237181">
+              <a:tr h="249551">
                 <a:tc>
                   <a:txBody>
                     <a:bodyPr/>
                     <a:lstStyle/>
                     <a:p>
                       <a:r>
-                        <a:rPr lang="de-DE" sz="900" dirty="0"/>
+                        <a:rPr lang="de-DE" sz="700" dirty="0"/>
                         <a:t>2g pull-down </a:t>
                       </a:r>
                       <a:r>
-                        <a:rPr lang="de-DE" sz="900" dirty="0" err="1"/>
+                        <a:rPr lang="de-DE" sz="700" dirty="0" err="1"/>
                         <a:t>case</a:t>
                       </a:r>
-                      <a:endParaRPr lang="en-US" sz="900" dirty="0"/>
+                      <a:endParaRPr lang="en-US" sz="700" dirty="0"/>
+                    </a:p>
+                  </a:txBody>
+                  <a:tcPr/>
+                </a:tc>
+                <a:tc>
+                  <a:txBody>
+                    <a:bodyPr/>
+                    <a:lstStyle/>
+                    <a:p>
+                      <a:endParaRPr lang="en-US" sz="700" dirty="0"/>
                     </a:p>
                   </a:txBody>
                   <a:tcPr/>
@@ -3497,29 +3662,83 @@
                   </a:ext>
                 </a:extLst>
               </a:tr>
-              <a:tr h="237181">
+              <a:tr h="181492">
                 <a:tc>
                   <a:txBody>
                     <a:bodyPr/>
                     <a:lstStyle/>
                     <a:p>
                       <a:r>
-                        <a:rPr lang="de-DE" sz="900" dirty="0"/>
+                        <a:rPr lang="de-DE" sz="700" dirty="0"/>
                         <a:t>Gust </a:t>
                       </a:r>
                       <a:r>
-                        <a:rPr lang="de-DE" sz="900" dirty="0" err="1"/>
+                        <a:rPr lang="de-DE" sz="700" dirty="0" err="1"/>
                         <a:t>load</a:t>
                       </a:r>
                       <a:r>
-                        <a:rPr lang="de-DE" sz="900" dirty="0"/>
+                        <a:rPr lang="de-DE" sz="700" dirty="0"/>
                         <a:t> </a:t>
                       </a:r>
                       <a:r>
-                        <a:rPr lang="de-DE" sz="900" dirty="0" err="1"/>
+                        <a:rPr lang="de-DE" sz="700" dirty="0" err="1"/>
                         <a:t>case</a:t>
                       </a:r>
-                      <a:endParaRPr lang="en-US" sz="900" dirty="0"/>
+                      <a:endParaRPr lang="en-US" sz="700" dirty="0"/>
+                    </a:p>
+                  </a:txBody>
+                  <a:tcPr/>
+                </a:tc>
+                <a:tc>
+                  <a:txBody>
+                    <a:bodyPr/>
+                    <a:lstStyle/>
+                    <a:p>
+                      <a:r>
+                        <a:rPr lang="de-DE" sz="700" dirty="0"/>
+                        <a:t>Gust </a:t>
+                      </a:r>
+                      <a:r>
+                        <a:rPr lang="de-DE" sz="700" dirty="0" err="1"/>
+                        <a:t>load</a:t>
+                      </a:r>
+                      <a:r>
+                        <a:rPr lang="de-DE" sz="700" dirty="0"/>
+                        <a:t> </a:t>
+                      </a:r>
+                      <a:r>
+                        <a:rPr lang="de-DE" sz="700" dirty="0" err="1"/>
+                        <a:t>case</a:t>
+                      </a:r>
+                      <a:r>
+                        <a:rPr lang="de-DE" sz="700" dirty="0"/>
+                        <a:t> </a:t>
+                      </a:r>
+                      <a:r>
+                        <a:rPr lang="de-DE" sz="700" dirty="0" err="1"/>
+                        <a:t>generated</a:t>
+                      </a:r>
+                      <a:r>
+                        <a:rPr lang="de-DE" sz="700" dirty="0"/>
+                        <a:t> </a:t>
+                      </a:r>
+                      <a:r>
+                        <a:rPr lang="de-DE" sz="700" dirty="0" err="1"/>
+                        <a:t>by</a:t>
+                      </a:r>
+                      <a:r>
+                        <a:rPr lang="de-DE" sz="700" dirty="0"/>
+                        <a:t> </a:t>
+                      </a:r>
+                      <a:r>
+                        <a:rPr lang="de-DE" sz="700" dirty="0" err="1"/>
+                        <a:t>gustLoadTool</a:t>
+                      </a:r>
+                      <a:r>
+                        <a:rPr lang="de-DE" sz="700" dirty="0"/>
+                        <a:t>. </a:t>
+                      </a:r>
+                      <a:endParaRPr lang="en-US" sz="700" dirty="0"/>
                     </a:p>
                   </a:txBody>
                   <a:tcPr/>
@@ -3530,17 +3749,27 @@
                   </a:ext>
                 </a:extLst>
               </a:tr>
-              <a:tr h="237181">
+              <a:tr h="117690">
                 <a:tc>
                   <a:txBody>
                     <a:bodyPr/>
                     <a:lstStyle/>
                     <a:p>
                       <a:r>
-                        <a:rPr lang="de-DE" sz="900" dirty="0"/>
+                        <a:rPr lang="de-DE" sz="700" dirty="0"/>
                         <a:t>…</a:t>
                       </a:r>
-                      <a:endParaRPr lang="en-US" sz="900" dirty="0"/>
+                      <a:endParaRPr lang="en-US" sz="700" dirty="0"/>
+                    </a:p>
+                  </a:txBody>
+                  <a:tcPr/>
+                </a:tc>
+                <a:tc>
+                  <a:txBody>
+                    <a:bodyPr/>
+                    <a:lstStyle/>
+                    <a:p>
+                      <a:endParaRPr lang="en-US" sz="700" dirty="0"/>
                     </a:p>
                   </a:txBody>
                   <a:tcPr/>
@@ -3555,36 +3784,6 @@
           </a:graphicData>
         </a:graphic>
       </p:graphicFrame>
-      <p:pic>
-        <p:nvPicPr>
-          <p:cNvPr id="8" name="Grafik 7">
-            <a:extLst>
-              <a:ext uri="{FF2B5EF4-FFF2-40B4-BE49-F238E27FC236}">
-                <a16:creationId xmlns:a16="http://schemas.microsoft.com/office/drawing/2014/main" id="{84F7AF73-4471-4C26-9B50-E5BD423C56A3}"/>
-              </a:ext>
-            </a:extLst>
-          </p:cNvPr>
-          <p:cNvPicPr>
-            <a:picLocks noChangeAspect="1"/>
-          </p:cNvPicPr>
-          <p:nvPr/>
-        </p:nvPicPr>
-        <p:blipFill>
-          <a:blip r:embed="rId2"/>
-          <a:stretch>
-            <a:fillRect/>
-          </a:stretch>
-        </p:blipFill>
-        <p:spPr>
-          <a:xfrm>
-            <a:off x="1387141" y="1335031"/>
-            <a:ext cx="3946859" cy="980876"/>
-          </a:xfrm>
-          <a:prstGeom prst="rect">
-            <a:avLst/>
-          </a:prstGeom>
-        </p:spPr>
-      </p:pic>
       <p:sp>
         <p:nvSpPr>
           <p:cNvPr id="11" name="Gleichschenkliges Dreieck 10">
@@ -3649,13 +3848,13 @@
           <p:nvPr/>
         </p:nvPicPr>
         <p:blipFill>
-          <a:blip r:embed="rId3">
+          <a:blip r:embed="rId2">
             <a:extLst>
               <a:ext uri="{28A0092B-C50C-407E-A947-70E740481C1C}">
                 <a14:useLocalDpi xmlns:a14="http://schemas.microsoft.com/office/drawing/2010/main" val="0"/>
               </a:ext>
               <a:ext uri="{96DAC541-7B7A-43D3-8B79-37D633B846F1}">
-                <asvg:svgBlip xmlns:asvg="http://schemas.microsoft.com/office/drawing/2016/SVG/main" r:embed="rId4"/>
+                <asvg:svgBlip xmlns:asvg="http://schemas.microsoft.com/office/drawing/2016/SVG/main" r:embed="rId3"/>
               </a:ext>
             </a:extLst>
           </a:blip>
@@ -3678,6 +3877,42 @@
               </a:prstClr>
             </a:outerShdw>
           </a:effectLst>
+        </p:spPr>
+      </p:pic>
+      <p:pic>
+        <p:nvPicPr>
+          <p:cNvPr id="6" name="Grafik 5">
+            <a:extLst>
+              <a:ext uri="{FF2B5EF4-FFF2-40B4-BE49-F238E27FC236}">
+                <a16:creationId xmlns:a16="http://schemas.microsoft.com/office/drawing/2014/main" id="{3D7386A5-1308-429B-939D-C8F2B19A1575}"/>
+              </a:ext>
+            </a:extLst>
+          </p:cNvPr>
+          <p:cNvPicPr>
+            <a:picLocks noChangeAspect="1"/>
+          </p:cNvPicPr>
+          <p:nvPr/>
+        </p:nvPicPr>
+        <p:blipFill>
+          <a:blip r:embed="rId4">
+            <a:extLst>
+              <a:ext uri="{28A0092B-C50C-407E-A947-70E740481C1C}">
+                <a14:useLocalDpi xmlns:a14="http://schemas.microsoft.com/office/drawing/2010/main" val="0"/>
+              </a:ext>
+            </a:extLst>
+          </a:blip>
+          <a:stretch>
+            <a:fillRect/>
+          </a:stretch>
+        </p:blipFill>
+        <p:spPr>
+          <a:xfrm>
+            <a:off x="1451308" y="1303047"/>
+            <a:ext cx="3946859" cy="973198"/>
+          </a:xfrm>
+          <a:prstGeom prst="rect">
+            <a:avLst/>
+          </a:prstGeom>
         </p:spPr>
       </p:pic>
     </p:spTree>

</xml_diff>